<commit_message>
Update 5g frecuencias y dispositivos.pptx
</commit_message>
<xml_diff>
--- a/5g frecuencias y dispositivos.pptx
+++ b/5g frecuencias y dispositivos.pptx
@@ -108,6 +108,11 @@
       </a:defRPr>
     </a:lvl9pPr>
   </p:defaultTextStyle>
+  <p:extLst>
+    <p:ext uri="{EFAFB233-063F-42B5-8137-9DF3F51BA10A}">
+      <p15:sldGuideLst xmlns:p15="http://schemas.microsoft.com/office/powerpoint/2012/main"/>
+    </p:ext>
+  </p:extLst>
 </p:presentation>
 </file>
 
@@ -4084,8 +4089,8 @@
               <a:t>IoT</a:t>
             </a:r>
             <a:r>
-              <a:rPr lang="es-ES"/>
-              <a:t>).</a:t>
+              <a:rPr lang="es-ES" dirty="0"/>
+              <a:t>). Telefónica.</a:t>
             </a:r>
           </a:p>
         </p:txBody>

</xml_diff>